<commit_message>
actualizacion de diapositiva para la presentacion
</commit_message>
<xml_diff>
--- a/group6/Voto_Presentacion.pptx
+++ b/group6/Voto_Presentacion.pptx
@@ -9,9 +9,11 @@
     <p:sldId id="257" r:id="rId3"/>
     <p:sldId id="258" r:id="rId4"/>
     <p:sldId id="261" r:id="rId5"/>
-    <p:sldId id="262" r:id="rId6"/>
-    <p:sldId id="260" r:id="rId7"/>
-    <p:sldId id="259" r:id="rId8"/>
+    <p:sldId id="260" r:id="rId6"/>
+    <p:sldId id="264" r:id="rId7"/>
+    <p:sldId id="265" r:id="rId8"/>
+    <p:sldId id="259" r:id="rId9"/>
+    <p:sldId id="263" r:id="rId10"/>
   </p:sldIdLst>
   <p:sldSz cx="12192000" cy="6858000"/>
   <p:notesSz cx="6858000" cy="9144000"/>
@@ -115,7 +117,7 @@
 
 <file path=ppt/commentAuthors.xml><?xml version="1.0" encoding="utf-8"?>
 <p:cmAuthorLst xmlns:a="http://schemas.openxmlformats.org/drawingml/2006/main" xmlns:r="http://schemas.openxmlformats.org/officeDocument/2006/relationships" xmlns:p="http://schemas.openxmlformats.org/presentationml/2006/main">
-  <p:cmAuthor id="1" name="Douglas" initials="D" lastIdx="3" clrIdx="0">
+  <p:cmAuthor id="1" name="Douglas" initials="D" lastIdx="10" clrIdx="0">
     <p:extLst>
       <p:ext uri="{19B8F6BF-5375-455C-9EA6-DF929625EA0E}">
         <p15:presenceInfo xmlns:p15="http://schemas.microsoft.com/office/powerpoint/2012/main" userId="f3670c3805dbfe7c" providerId="Windows Live"/>
@@ -143,22 +145,6 @@
 
 <file path=ppt/comments/comment2.xml><?xml version="1.0" encoding="utf-8"?>
 <p:cmLst xmlns:a="http://schemas.openxmlformats.org/drawingml/2006/main" xmlns:r="http://schemas.openxmlformats.org/officeDocument/2006/relationships" xmlns:p="http://schemas.openxmlformats.org/presentationml/2006/main">
-  <p:cm authorId="1" dt="2020-05-21T19:26:32.330" idx="1">
-    <p:pos x="10" y="10"/>
-    <p:text>TurtleDB Es un framework de JavaScript y un adaptador de base de datos en el navegador para construir primero aplicaciones web colaborativas fuera de línea.
-Implementando la base de datos IndexedDB en el navegador, le permite a los desarrolladores administrar datos de documentos del lado del cliente y tener capacidades listas para usar sin conexión sin instalar ningún software adicional.
-Ofrece integración de back-end con MongoDB (a través de un segundo paquete, TortoiseDB) para habilitar Bi - sincronización direccional y colaboración multicliente.</p:text>
-    <p:extLst>
-      <p:ext uri="{C676402C-5697-4E1C-873F-D02D1690AC5C}">
-        <p15:threadingInfo xmlns:p15="http://schemas.microsoft.com/office/powerpoint/2012/main" timeZoneBias="300"/>
-      </p:ext>
-    </p:extLst>
-  </p:cm>
-</p:cmLst>
-</file>
-
-<file path=ppt/comments/comment3.xml><?xml version="1.0" encoding="utf-8"?>
-<p:cmLst xmlns:a="http://schemas.openxmlformats.org/drawingml/2006/main" xmlns:r="http://schemas.openxmlformats.org/officeDocument/2006/relationships" xmlns:p="http://schemas.openxmlformats.org/presentationml/2006/main">
   <p:cm authorId="1" dt="2020-05-21T19:27:36.773" idx="2">
     <p:pos x="10" y="10"/>
     <p:text>Modo Offline, es una opción de diseño que permite que las aplicaciones web permanezcan funcionales incluso en los casos en que no hay conexión a Internet. Idealmente, los usuarios de una primera aplicación fuera de línea no notan ninguna diferencia en su experiencia en un escenario en línea o fuera de línea.
@@ -173,6 +159,88 @@
     <p:pos x="146" y="146"/>
     <p:text>Todos los activos y datos se almacenan en el servidor y, para poder acceder a ellos, los clientes deben realizar solicitudes repetidas a través de la red.
 Aunque esto es a lo que estamos acostumbrados, hay algunos inconvenientes bastante significativos en este enfoque</p:text>
+    <p:extLst>
+      <p:ext uri="{C676402C-5697-4E1C-873F-D02D1690AC5C}">
+        <p15:threadingInfo xmlns:p15="http://schemas.microsoft.com/office/powerpoint/2012/main" timeZoneBias="300"/>
+      </p:ext>
+    </p:extLst>
+  </p:cm>
+</p:cmLst>
+</file>
+
+<file path=ppt/comments/comment3.xml><?xml version="1.0" encoding="utf-8"?>
+<p:cmLst xmlns:a="http://schemas.openxmlformats.org/drawingml/2006/main" xmlns:r="http://schemas.openxmlformats.org/officeDocument/2006/relationships" xmlns:p="http://schemas.openxmlformats.org/presentationml/2006/main">
+  <p:cm authorId="1" dt="2020-05-21T19:52:15.766" idx="6">
+    <p:pos x="10" y="10"/>
+    <p:text>En lugar de construir otra base de datos similar a SQL, IDB es una base de datos orientada a objetos escrita en JavaScript. Es un sistema de almacenamiento de valor clave y permite características de bases de datos más sofisticadas como la indexación y la creación de múltiples tiendas.</p:text>
+    <p:extLst>
+      <p:ext uri="{C676402C-5697-4E1C-873F-D02D1690AC5C}">
+        <p15:threadingInfo xmlns:p15="http://schemas.microsoft.com/office/powerpoint/2012/main" timeZoneBias="300"/>
+      </p:ext>
+    </p:extLst>
+  </p:cm>
+  <p:cm authorId="1" dt="2020-05-21T19:54:15.254" idx="7">
+    <p:pos x="10" y="146"/>
+    <p:text>Una de las ventajas de IndexDB: es que las consultas de lectura única limitan el rendimiento. Al iterar a través de una lista de consultas, cada iteración abre y cierra una conexión IndexedDB. Esto no aprovecha el hecho de que IndexedDB puede recibir múltiples conexiones, lo que significa que las consultas independientes se pueden ejecutar simultáneamente.</p:text>
+    <p:extLst>
+      <p:ext uri="{C676402C-5697-4E1C-873F-D02D1690AC5C}">
+        <p15:threadingInfo xmlns:p15="http://schemas.microsoft.com/office/powerpoint/2012/main" timeZoneBias="300">
+          <p15:parentCm authorId="1" idx="6"/>
+        </p15:threadingInfo>
+      </p:ext>
+    </p:extLst>
+  </p:cm>
+  <p:cm authorId="1" dt="2020-05-21T19:55:03.336" idx="8">
+    <p:pos x="10" y="282"/>
+    <p:text>Por lo tanto, es posible ejecutar consultas en paralelo, pero es importante asegurarse de que todas se completen secuencialmente</p:text>
+    <p:extLst>
+      <p:ext uri="{C676402C-5697-4E1C-873F-D02D1690AC5C}">
+        <p15:threadingInfo xmlns:p15="http://schemas.microsoft.com/office/powerpoint/2012/main" timeZoneBias="300">
+          <p15:parentCm authorId="1" idx="6"/>
+        </p15:threadingInfo>
+      </p:ext>
+    </p:extLst>
+  </p:cm>
+</p:cmLst>
+</file>
+
+<file path=ppt/comments/comment4.xml><?xml version="1.0" encoding="utf-8"?>
+<p:cmLst xmlns:a="http://schemas.openxmlformats.org/drawingml/2006/main" xmlns:r="http://schemas.openxmlformats.org/officeDocument/2006/relationships" xmlns:p="http://schemas.openxmlformats.org/presentationml/2006/main">
+  <p:cm authorId="1" dt="2020-05-21T19:56:28.548" idx="9">
+    <p:pos x="10" y="10"/>
+    <p:text>Una API orientada al desarrollador es posible una vez que se abordan estos desafíos. Para todas estas operaciones dentro de turtleDB, los desarrolladores pueden simplemente abrir sus navegadores, configurar una base de datos y comenzar a interactuar con el BID. Ya no necesitan preocuparse por tareas como abrir y cerrar conexiones a BID, crear una tienda, configurar controladores de éxito y onerror para operaciones básicas, o controlar el flujo de operaciones asincrónicas.</p:text>
+    <p:extLst>
+      <p:ext uri="{C676402C-5697-4E1C-873F-D02D1690AC5C}">
+        <p15:threadingInfo xmlns:p15="http://schemas.microsoft.com/office/powerpoint/2012/main" timeZoneBias="300"/>
+      </p:ext>
+    </p:extLst>
+  </p:cm>
+  <p:cm authorId="1" dt="2020-05-21T19:58:10.662" idx="10">
+    <p:pos x="146" y="146"/>
+    <p:text>El diseño de turtleDB consta de dos módulos. El primero es un adaptador IDB que contiene todo el código nativo para interactuar con IDB. La otra es una API pública y amigable para el desarrollador que se comunica con el adaptador IDB. En resumen, un desarrollador puede interactuar con BID sin tener que escribir una sola línea de código específico de BID.</p:text>
+    <p:extLst>
+      <p:ext uri="{C676402C-5697-4E1C-873F-D02D1690AC5C}">
+        <p15:threadingInfo xmlns:p15="http://schemas.microsoft.com/office/powerpoint/2012/main" timeZoneBias="300"/>
+      </p:ext>
+    </p:extLst>
+  </p:cm>
+</p:cmLst>
+</file>
+
+<file path=ppt/comments/comment5.xml><?xml version="1.0" encoding="utf-8"?>
+<p:cmLst xmlns:a="http://schemas.openxmlformats.org/drawingml/2006/main" xmlns:r="http://schemas.openxmlformats.org/officeDocument/2006/relationships" xmlns:p="http://schemas.openxmlformats.org/presentationml/2006/main">
+  <p:cm authorId="1" dt="2020-05-21T19:40:35.634" idx="4">
+    <p:pos x="10" y="10"/>
+    <p:text>turtleDB usa un protocolo HTTP. El uso de una serie de ciclos de solicitud-respuesta HTTP para ambas direcciones de sincronización permite que la lógica de la aplicación se organice en una serie de solicitudes GET y POST que se ven muy similares para cada dirección, y abstrae el proceso de sincronización por encima de los detalles de trabajar con IndexedDB o MongoDB . Los clientes que ejecutan turtleDB realizan solicitudes HTTP utilizando la biblioteca axios ; el servidor usa Express como enrutador para manejar estas solicitudes.</p:text>
+    <p:extLst>
+      <p:ext uri="{C676402C-5697-4E1C-873F-D02D1690AC5C}">
+        <p15:threadingInfo xmlns:p15="http://schemas.microsoft.com/office/powerpoint/2012/main" timeZoneBias="300"/>
+      </p:ext>
+    </p:extLst>
+  </p:cm>
+  <p:cm authorId="1" dt="2020-05-21T19:49:28.051" idx="5">
+    <p:pos x="146" y="146"/>
+    <p:text>turtleDB utiliza puntos de control basados ​​en las claves primarias de la base de datos para garantizar que los clientes y el servidor solo compartan nuevos cambios en una sesión de sincronización.</p:text>
     <p:extLst>
       <p:ext uri="{C676402C-5697-4E1C-873F-D02D1690AC5C}">
         <p15:threadingInfo xmlns:p15="http://schemas.microsoft.com/office/powerpoint/2012/main" timeZoneBias="300"/>
@@ -6393,72 +6461,6 @@
           <a:lstStyle/>
           <a:p>
             <a:r>
-              <a:rPr lang="es-ES" dirty="0"/>
-              <a:t>TurtleDB como </a:t>
-            </a:r>
-            <a:r>
-              <a:rPr lang="es-ES" dirty="0" smtClean="0"/>
-              <a:t>Tecnología principal</a:t>
-            </a:r>
-            <a:endParaRPr lang="es-ES" dirty="0"/>
-          </a:p>
-        </p:txBody>
-      </p:sp>
-    </p:spTree>
-    <p:extLst>
-      <p:ext uri="{BB962C8B-B14F-4D97-AF65-F5344CB8AC3E}">
-        <p14:creationId xmlns:p14="http://schemas.microsoft.com/office/powerpoint/2010/main" val="1197920832"/>
-      </p:ext>
-    </p:extLst>
-  </p:cSld>
-  <p:clrMapOvr>
-    <a:masterClrMapping/>
-  </p:clrMapOvr>
-  <p:timing>
-    <p:tnLst>
-      <p:par>
-        <p:cTn id="1" dur="indefinite" restart="never" nodeType="tmRoot"/>
-      </p:par>
-    </p:tnLst>
-  </p:timing>
-</p:sld>
-</file>
-
-<file path=ppt/slides/slide6.xml><?xml version="1.0" encoding="utf-8"?>
-<p:sld xmlns:a="http://schemas.openxmlformats.org/drawingml/2006/main" xmlns:r="http://schemas.openxmlformats.org/officeDocument/2006/relationships" xmlns:p="http://schemas.openxmlformats.org/presentationml/2006/main">
-  <p:cSld>
-    <p:spTree>
-      <p:nvGrpSpPr>
-        <p:cNvPr id="1" name=""/>
-        <p:cNvGrpSpPr/>
-        <p:nvPr/>
-      </p:nvGrpSpPr>
-      <p:grpSpPr>
-        <a:xfrm>
-          <a:off x="0" y="0"/>
-          <a:ext cx="0" cy="0"/>
-          <a:chOff x="0" y="0"/>
-          <a:chExt cx="0" cy="0"/>
-        </a:xfrm>
-      </p:grpSpPr>
-      <p:sp>
-        <p:nvSpPr>
-          <p:cNvPr id="2" name="Título 1"/>
-          <p:cNvSpPr>
-            <a:spLocks noGrp="1"/>
-          </p:cNvSpPr>
-          <p:nvPr>
-            <p:ph type="title"/>
-          </p:nvPr>
-        </p:nvSpPr>
-        <p:spPr/>
-        <p:txBody>
-          <a:bodyPr>
-            <a:normAutofit/>
-          </a:bodyPr>
-          <a:lstStyle/>
-          <a:p>
-            <a:r>
               <a:rPr lang="es-ES" dirty="0" smtClean="0"/>
               <a:t>Operatividad en modo OFFLINE</a:t>
             </a:r>
@@ -6574,6 +6576,113 @@
 </p:sld>
 </file>
 
+<file path=ppt/slides/slide6.xml><?xml version="1.0" encoding="utf-8"?>
+<p:sld xmlns:a="http://schemas.openxmlformats.org/drawingml/2006/main" xmlns:r="http://schemas.openxmlformats.org/officeDocument/2006/relationships" xmlns:p="http://schemas.openxmlformats.org/presentationml/2006/main">
+  <p:cSld>
+    <p:spTree>
+      <p:nvGrpSpPr>
+        <p:cNvPr id="1" name=""/>
+        <p:cNvGrpSpPr/>
+        <p:nvPr/>
+      </p:nvGrpSpPr>
+      <p:grpSpPr>
+        <a:xfrm>
+          <a:off x="0" y="0"/>
+          <a:ext cx="0" cy="0"/>
+          <a:chOff x="0" y="0"/>
+          <a:chExt cx="0" cy="0"/>
+        </a:xfrm>
+      </p:grpSpPr>
+      <p:sp>
+        <p:nvSpPr>
+          <p:cNvPr id="2" name="Título 1"/>
+          <p:cNvSpPr>
+            <a:spLocks noGrp="1"/>
+          </p:cNvSpPr>
+          <p:nvPr>
+            <p:ph type="title"/>
+          </p:nvPr>
+        </p:nvSpPr>
+        <p:spPr/>
+        <p:txBody>
+          <a:bodyPr/>
+          <a:lstStyle/>
+          <a:p>
+            <a:r>
+              <a:rPr lang="es-ES" dirty="0"/>
+              <a:t>Rendimiento de </a:t>
+            </a:r>
+            <a:r>
+              <a:rPr lang="es-ES" dirty="0" err="1"/>
+              <a:t>IndexedDB</a:t>
+            </a:r>
+            <a:endParaRPr lang="es-ES" dirty="0"/>
+          </a:p>
+        </p:txBody>
+      </p:sp>
+      <p:sp>
+        <p:nvSpPr>
+          <p:cNvPr id="3" name="Marcador de contenido 2"/>
+          <p:cNvSpPr>
+            <a:spLocks noGrp="1"/>
+          </p:cNvSpPr>
+          <p:nvPr>
+            <p:ph idx="1"/>
+          </p:nvPr>
+        </p:nvSpPr>
+        <p:spPr/>
+        <p:txBody>
+          <a:bodyPr/>
+          <a:lstStyle/>
+          <a:p>
+            <a:endParaRPr lang="es-ES"/>
+          </a:p>
+        </p:txBody>
+      </p:sp>
+      <p:pic>
+        <p:nvPicPr>
+          <p:cNvPr id="4" name="Imagen 3"/>
+          <p:cNvPicPr>
+            <a:picLocks noChangeAspect="1"/>
+          </p:cNvPicPr>
+          <p:nvPr/>
+        </p:nvPicPr>
+        <p:blipFill>
+          <a:blip r:embed="rId2"/>
+          <a:stretch>
+            <a:fillRect/>
+          </a:stretch>
+        </p:blipFill>
+        <p:spPr>
+          <a:xfrm>
+            <a:off x="1833562" y="2758075"/>
+            <a:ext cx="8524874" cy="3308293"/>
+          </a:xfrm>
+          <a:prstGeom prst="rect">
+            <a:avLst/>
+          </a:prstGeom>
+        </p:spPr>
+      </p:pic>
+    </p:spTree>
+    <p:extLst>
+      <p:ext uri="{BB962C8B-B14F-4D97-AF65-F5344CB8AC3E}">
+        <p14:creationId xmlns:p14="http://schemas.microsoft.com/office/powerpoint/2010/main" val="3323897647"/>
+      </p:ext>
+    </p:extLst>
+  </p:cSld>
+  <p:clrMapOvr>
+    <a:masterClrMapping/>
+  </p:clrMapOvr>
+  <p:timing>
+    <p:tnLst>
+      <p:par>
+        <p:cTn id="1" dur="indefinite" restart="never" nodeType="tmRoot"/>
+      </p:par>
+    </p:tnLst>
+  </p:timing>
+</p:sld>
+</file>
+
 <file path=ppt/slides/slide7.xml><?xml version="1.0" encoding="utf-8"?>
 <p:sld xmlns:a="http://schemas.openxmlformats.org/drawingml/2006/main" xmlns:r="http://schemas.openxmlformats.org/officeDocument/2006/relationships" xmlns:p="http://schemas.openxmlformats.org/presentationml/2006/main">
   <p:cSld>
@@ -6607,7 +6716,114 @@
           <a:lstStyle/>
           <a:p>
             <a:r>
-              <a:rPr lang="es-ES" smtClean="0"/>
+              <a:rPr lang="es-ES" dirty="0"/>
+              <a:t>API de desarrollador de </a:t>
+            </a:r>
+            <a:r>
+              <a:rPr lang="es-ES" dirty="0" err="1"/>
+              <a:t>turtleDB</a:t>
+            </a:r>
+            <a:endParaRPr lang="es-ES" dirty="0"/>
+          </a:p>
+        </p:txBody>
+      </p:sp>
+      <p:sp>
+        <p:nvSpPr>
+          <p:cNvPr id="3" name="Marcador de contenido 2"/>
+          <p:cNvSpPr>
+            <a:spLocks noGrp="1"/>
+          </p:cNvSpPr>
+          <p:nvPr>
+            <p:ph idx="1"/>
+          </p:nvPr>
+        </p:nvSpPr>
+        <p:spPr/>
+        <p:txBody>
+          <a:bodyPr/>
+          <a:lstStyle/>
+          <a:p>
+            <a:endParaRPr lang="es-ES"/>
+          </a:p>
+        </p:txBody>
+      </p:sp>
+      <p:pic>
+        <p:nvPicPr>
+          <p:cNvPr id="4" name="Imagen 3"/>
+          <p:cNvPicPr>
+            <a:picLocks noChangeAspect="1"/>
+          </p:cNvPicPr>
+          <p:nvPr/>
+        </p:nvPicPr>
+        <p:blipFill>
+          <a:blip r:embed="rId2"/>
+          <a:stretch>
+            <a:fillRect/>
+          </a:stretch>
+        </p:blipFill>
+        <p:spPr>
+          <a:xfrm>
+            <a:off x="2847975" y="2686050"/>
+            <a:ext cx="7239000" cy="2381250"/>
+          </a:xfrm>
+          <a:prstGeom prst="rect">
+            <a:avLst/>
+          </a:prstGeom>
+        </p:spPr>
+      </p:pic>
+    </p:spTree>
+    <p:extLst>
+      <p:ext uri="{BB962C8B-B14F-4D97-AF65-F5344CB8AC3E}">
+        <p14:creationId xmlns:p14="http://schemas.microsoft.com/office/powerpoint/2010/main" val="3854454751"/>
+      </p:ext>
+    </p:extLst>
+  </p:cSld>
+  <p:clrMapOvr>
+    <a:masterClrMapping/>
+  </p:clrMapOvr>
+  <p:timing>
+    <p:tnLst>
+      <p:par>
+        <p:cTn id="1" dur="indefinite" restart="never" nodeType="tmRoot"/>
+      </p:par>
+    </p:tnLst>
+  </p:timing>
+</p:sld>
+</file>
+
+<file path=ppt/slides/slide8.xml><?xml version="1.0" encoding="utf-8"?>
+<p:sld xmlns:a="http://schemas.openxmlformats.org/drawingml/2006/main" xmlns:r="http://schemas.openxmlformats.org/officeDocument/2006/relationships" xmlns:p="http://schemas.openxmlformats.org/presentationml/2006/main">
+  <p:cSld>
+    <p:spTree>
+      <p:nvGrpSpPr>
+        <p:cNvPr id="1" name=""/>
+        <p:cNvGrpSpPr/>
+        <p:nvPr/>
+      </p:nvGrpSpPr>
+      <p:grpSpPr>
+        <a:xfrm>
+          <a:off x="0" y="0"/>
+          <a:ext cx="0" cy="0"/>
+          <a:chOff x="0" y="0"/>
+          <a:chExt cx="0" cy="0"/>
+        </a:xfrm>
+      </p:grpSpPr>
+      <p:sp>
+        <p:nvSpPr>
+          <p:cNvPr id="2" name="Título 1"/>
+          <p:cNvSpPr>
+            <a:spLocks noGrp="1"/>
+          </p:cNvSpPr>
+          <p:nvPr>
+            <p:ph type="title"/>
+          </p:nvPr>
+        </p:nvSpPr>
+        <p:spPr/>
+        <p:txBody>
+          <a:bodyPr/>
+          <a:lstStyle/>
+          <a:p>
+            <a:r>
+              <a:rPr lang="es-ES" dirty="0" smtClean="0"/>
               <a:t>Modelo de sincronización</a:t>
             </a:r>
             <a:endParaRPr lang="es-ES" dirty="0"/>
@@ -6668,6 +6884,87 @@
     <p:extLst>
       <p:ext uri="{BB962C8B-B14F-4D97-AF65-F5344CB8AC3E}">
         <p14:creationId xmlns:p14="http://schemas.microsoft.com/office/powerpoint/2010/main" val="2274611485"/>
+      </p:ext>
+    </p:extLst>
+  </p:cSld>
+  <p:clrMapOvr>
+    <a:masterClrMapping/>
+  </p:clrMapOvr>
+  <p:timing>
+    <p:tnLst>
+      <p:par>
+        <p:cTn id="1" dur="indefinite" restart="never" nodeType="tmRoot"/>
+      </p:par>
+    </p:tnLst>
+  </p:timing>
+</p:sld>
+</file>
+
+<file path=ppt/slides/slide9.xml><?xml version="1.0" encoding="utf-8"?>
+<p:sld xmlns:a="http://schemas.openxmlformats.org/drawingml/2006/main" xmlns:r="http://schemas.openxmlformats.org/officeDocument/2006/relationships" xmlns:p="http://schemas.openxmlformats.org/presentationml/2006/main">
+  <p:cSld>
+    <p:spTree>
+      <p:nvGrpSpPr>
+        <p:cNvPr id="1" name=""/>
+        <p:cNvGrpSpPr/>
+        <p:nvPr/>
+      </p:nvGrpSpPr>
+      <p:grpSpPr>
+        <a:xfrm>
+          <a:off x="0" y="0"/>
+          <a:ext cx="0" cy="0"/>
+          <a:chOff x="0" y="0"/>
+          <a:chExt cx="0" cy="0"/>
+        </a:xfrm>
+      </p:grpSpPr>
+      <p:sp>
+        <p:nvSpPr>
+          <p:cNvPr id="2" name="Título 1"/>
+          <p:cNvSpPr>
+            <a:spLocks noGrp="1"/>
+          </p:cNvSpPr>
+          <p:nvPr>
+            <p:ph type="title"/>
+          </p:nvPr>
+        </p:nvSpPr>
+        <p:spPr/>
+        <p:txBody>
+          <a:bodyPr>
+            <a:normAutofit/>
+          </a:bodyPr>
+          <a:lstStyle/>
+          <a:p>
+            <a:r>
+              <a:rPr lang="es-ES" dirty="0" smtClean="0"/>
+              <a:t>DEMO: PANTALLAS</a:t>
+            </a:r>
+            <a:endParaRPr lang="es-ES" dirty="0"/>
+          </a:p>
+        </p:txBody>
+      </p:sp>
+      <p:sp>
+        <p:nvSpPr>
+          <p:cNvPr id="3" name="Marcador de contenido 2"/>
+          <p:cNvSpPr>
+            <a:spLocks noGrp="1"/>
+          </p:cNvSpPr>
+          <p:nvPr>
+            <p:ph idx="1"/>
+          </p:nvPr>
+        </p:nvSpPr>
+        <p:spPr/>
+        <p:txBody>
+          <a:bodyPr/>
+          <a:lstStyle/>
+          <a:p>
+            <a:endParaRPr lang="es-ES"/>
+          </a:p>
+        </p:txBody>
+      </p:sp>
+    </p:spTree>
+    <p:extLst>
+      <p:ext uri="{BB962C8B-B14F-4D97-AF65-F5344CB8AC3E}">
+        <p14:creationId xmlns:p14="http://schemas.microsoft.com/office/powerpoint/2010/main" val="3509889845"/>
       </p:ext>
     </p:extLst>
   </p:cSld>

</xml_diff>

<commit_message>
Prueba con Server Worker
</commit_message>
<xml_diff>
--- a/group6/Voto_Presentacion.pptx
+++ b/group6/Voto_Presentacion.pptx
@@ -586,7 +586,7 @@
           <a:p>
             <a:fld id="{4859D79F-FFBF-4236-82FD-775486F0F05B}" type="datetimeFigureOut">
               <a:rPr lang="es-ES" smtClean="0"/>
-              <a:t>22/05/2020</a:t>
+              <a:t>23/05/2020</a:t>
             </a:fld>
             <a:endParaRPr lang="es-ES"/>
           </a:p>
@@ -910,7 +910,7 @@
           <a:p>
             <a:fld id="{4859D79F-FFBF-4236-82FD-775486F0F05B}" type="datetimeFigureOut">
               <a:rPr lang="es-ES" smtClean="0"/>
-              <a:t>22/05/2020</a:t>
+              <a:t>23/05/2020</a:t>
             </a:fld>
             <a:endParaRPr lang="es-ES"/>
           </a:p>
@@ -1158,7 +1158,7 @@
           <a:p>
             <a:fld id="{4859D79F-FFBF-4236-82FD-775486F0F05B}" type="datetimeFigureOut">
               <a:rPr lang="es-ES" smtClean="0"/>
-              <a:t>22/05/2020</a:t>
+              <a:t>23/05/2020</a:t>
             </a:fld>
             <a:endParaRPr lang="es-ES"/>
           </a:p>
@@ -1497,7 +1497,7 @@
           <a:p>
             <a:fld id="{4859D79F-FFBF-4236-82FD-775486F0F05B}" type="datetimeFigureOut">
               <a:rPr lang="es-ES" smtClean="0"/>
-              <a:t>22/05/2020</a:t>
+              <a:t>23/05/2020</a:t>
             </a:fld>
             <a:endParaRPr lang="es-ES"/>
           </a:p>
@@ -1844,7 +1844,7 @@
           <a:p>
             <a:fld id="{4859D79F-FFBF-4236-82FD-775486F0F05B}" type="datetimeFigureOut">
               <a:rPr lang="es-ES" smtClean="0"/>
-              <a:t>22/05/2020</a:t>
+              <a:t>23/05/2020</a:t>
             </a:fld>
             <a:endParaRPr lang="es-ES"/>
           </a:p>
@@ -2218,7 +2218,7 @@
           <a:p>
             <a:fld id="{4859D79F-FFBF-4236-82FD-775486F0F05B}" type="datetimeFigureOut">
               <a:rPr lang="es-ES" smtClean="0"/>
-              <a:t>22/05/2020</a:t>
+              <a:t>23/05/2020</a:t>
             </a:fld>
             <a:endParaRPr lang="es-ES"/>
           </a:p>
@@ -2688,7 +2688,7 @@
           <a:p>
             <a:fld id="{4859D79F-FFBF-4236-82FD-775486F0F05B}" type="datetimeFigureOut">
               <a:rPr lang="es-ES" smtClean="0"/>
-              <a:t>22/05/2020</a:t>
+              <a:t>23/05/2020</a:t>
             </a:fld>
             <a:endParaRPr lang="es-ES"/>
           </a:p>
@@ -2893,7 +2893,7 @@
           <a:p>
             <a:fld id="{4859D79F-FFBF-4236-82FD-775486F0F05B}" type="datetimeFigureOut">
               <a:rPr lang="es-ES" smtClean="0"/>
-              <a:t>22/05/2020</a:t>
+              <a:t>23/05/2020</a:t>
             </a:fld>
             <a:endParaRPr lang="es-ES"/>
           </a:p>
@@ -3104,7 +3104,7 @@
           <a:p>
             <a:fld id="{4859D79F-FFBF-4236-82FD-775486F0F05B}" type="datetimeFigureOut">
               <a:rPr lang="es-ES" smtClean="0"/>
-              <a:t>22/05/2020</a:t>
+              <a:t>23/05/2020</a:t>
             </a:fld>
             <a:endParaRPr lang="es-ES"/>
           </a:p>
@@ -3336,7 +3336,7 @@
           <a:p>
             <a:fld id="{4859D79F-FFBF-4236-82FD-775486F0F05B}" type="datetimeFigureOut">
               <a:rPr lang="es-ES" smtClean="0"/>
-              <a:t>22/05/2020</a:t>
+              <a:t>23/05/2020</a:t>
             </a:fld>
             <a:endParaRPr lang="es-ES"/>
           </a:p>
@@ -3584,7 +3584,7 @@
           <a:p>
             <a:fld id="{4859D79F-FFBF-4236-82FD-775486F0F05B}" type="datetimeFigureOut">
               <a:rPr lang="es-ES" smtClean="0"/>
-              <a:t>22/05/2020</a:t>
+              <a:t>23/05/2020</a:t>
             </a:fld>
             <a:endParaRPr lang="es-ES"/>
           </a:p>
@@ -3882,7 +3882,7 @@
           <a:p>
             <a:fld id="{4859D79F-FFBF-4236-82FD-775486F0F05B}" type="datetimeFigureOut">
               <a:rPr lang="es-ES" smtClean="0"/>
-              <a:t>22/05/2020</a:t>
+              <a:t>23/05/2020</a:t>
             </a:fld>
             <a:endParaRPr lang="es-ES"/>
           </a:p>
@@ -4276,7 +4276,7 @@
           <a:p>
             <a:fld id="{4859D79F-FFBF-4236-82FD-775486F0F05B}" type="datetimeFigureOut">
               <a:rPr lang="es-ES" smtClean="0"/>
-              <a:t>22/05/2020</a:t>
+              <a:t>23/05/2020</a:t>
             </a:fld>
             <a:endParaRPr lang="es-ES"/>
           </a:p>
@@ -4425,7 +4425,7 @@
           <a:p>
             <a:fld id="{4859D79F-FFBF-4236-82FD-775486F0F05B}" type="datetimeFigureOut">
               <a:rPr lang="es-ES" smtClean="0"/>
-              <a:t>22/05/2020</a:t>
+              <a:t>23/05/2020</a:t>
             </a:fld>
             <a:endParaRPr lang="es-ES"/>
           </a:p>
@@ -4551,7 +4551,7 @@
           <a:p>
             <a:fld id="{4859D79F-FFBF-4236-82FD-775486F0F05B}" type="datetimeFigureOut">
               <a:rPr lang="es-ES" smtClean="0"/>
-              <a:t>22/05/2020</a:t>
+              <a:t>23/05/2020</a:t>
             </a:fld>
             <a:endParaRPr lang="es-ES"/>
           </a:p>
@@ -4806,7 +4806,7 @@
           <a:p>
             <a:fld id="{4859D79F-FFBF-4236-82FD-775486F0F05B}" type="datetimeFigureOut">
               <a:rPr lang="es-ES" smtClean="0"/>
-              <a:t>22/05/2020</a:t>
+              <a:t>23/05/2020</a:t>
             </a:fld>
             <a:endParaRPr lang="es-ES"/>
           </a:p>
@@ -5121,7 +5121,7 @@
           <a:p>
             <a:fld id="{4859D79F-FFBF-4236-82FD-775486F0F05B}" type="datetimeFigureOut">
               <a:rPr lang="es-ES" smtClean="0"/>
-              <a:t>22/05/2020</a:t>
+              <a:t>23/05/2020</a:t>
             </a:fld>
             <a:endParaRPr lang="es-ES"/>
           </a:p>
@@ -5472,7 +5472,7 @@
           <a:p>
             <a:fld id="{4859D79F-FFBF-4236-82FD-775486F0F05B}" type="datetimeFigureOut">
               <a:rPr lang="es-ES" smtClean="0"/>
-              <a:t>22/05/2020</a:t>
+              <a:t>23/05/2020</a:t>
             </a:fld>
             <a:endParaRPr lang="es-ES"/>
           </a:p>
@@ -6143,7 +6143,7 @@
           <a:p>
             <a:r>
               <a:rPr lang="es-ES" dirty="0" smtClean="0"/>
-              <a:t>Antecedentes</a:t>
+              <a:t>Antecedentes y Problema</a:t>
             </a:r>
             <a:endParaRPr lang="es-ES" dirty="0"/>
           </a:p>
@@ -6193,14 +6193,10 @@
             <a:pPr algn="just"/>
             <a:r>
               <a:rPr lang="es-ES" dirty="0"/>
-              <a:t>Por tal motivo en un </a:t>
-            </a:r>
-            <a:r>
-              <a:rPr lang="es-ES"/>
-              <a:t>voto </a:t>
-            </a:r>
-            <a:r>
-              <a:rPr lang="es-ES" smtClean="0"/>
+              <a:t>Por tal motivo en un voto </a:t>
+            </a:r>
+            <a:r>
+              <a:rPr lang="es-ES" dirty="0" smtClean="0"/>
               <a:t>electrónico </a:t>
             </a:r>
             <a:r>
@@ -6310,7 +6306,11 @@
           <a:p>
             <a:r>
               <a:rPr lang="es-ES" sz="4200" dirty="0" smtClean="0"/>
-              <a:t>Sistema de Emisión de Voto Electrónico</a:t>
+              <a:t>Proceso de </a:t>
+            </a:r>
+            <a:r>
+              <a:rPr lang="es-ES" sz="4200" dirty="0" smtClean="0"/>
+              <a:t>Emisión de Voto Electrónico</a:t>
             </a:r>
             <a:endParaRPr lang="es-ES" sz="4200" dirty="0"/>
           </a:p>
@@ -7154,6 +7154,36 @@
           </p:txBody>
         </p:sp>
       </p:grpSp>
+      <p:sp>
+        <p:nvSpPr>
+          <p:cNvPr id="3" name="CuadroTexto 2"/>
+          <p:cNvSpPr txBox="1"/>
+          <p:nvPr/>
+        </p:nvSpPr>
+        <p:spPr>
+          <a:xfrm>
+            <a:off x="2099256" y="5254580"/>
+            <a:ext cx="1422506" cy="369332"/>
+          </a:xfrm>
+          <a:prstGeom prst="rect">
+            <a:avLst/>
+          </a:prstGeom>
+          <a:noFill/>
+        </p:spPr>
+        <p:txBody>
+          <a:bodyPr wrap="square" rtlCol="0">
+            <a:spAutoFit/>
+          </a:bodyPr>
+          <a:lstStyle/>
+          <a:p>
+            <a:r>
+              <a:rPr lang="es-CR" dirty="0" smtClean="0"/>
+              <a:t>Pegar demo</a:t>
+            </a:r>
+            <a:endParaRPr lang="es-CR" dirty="0"/>
+          </a:p>
+        </p:txBody>
+      </p:sp>
     </p:spTree>
     <p:extLst>
       <p:ext uri="{BB962C8B-B14F-4D97-AF65-F5344CB8AC3E}">
@@ -7622,7 +7652,7 @@
           <a:bodyPr/>
           <a:lstStyle/>
           <a:p>
-            <a:endParaRPr lang="es-ES"/>
+            <a:endParaRPr lang="es-ES" dirty="0"/>
           </a:p>
         </p:txBody>
       </p:sp>
@@ -7815,29 +7845,29 @@
           <a:lstStyle/>
           <a:p>
             <a:r>
-              <a:rPr lang="es-ES" dirty="0" smtClean="0"/>
-              <a:t>DEMO: PANTALLAS</a:t>
-            </a:r>
+              <a:rPr lang="es-ES" sz="4000" dirty="0" smtClean="0"/>
+              <a:t>BREVE DEMOSTRACION</a:t>
+            </a:r>
+            <a:endParaRPr lang="es-ES" sz="4000" dirty="0"/>
+          </a:p>
+        </p:txBody>
+      </p:sp>
+      <p:sp>
+        <p:nvSpPr>
+          <p:cNvPr id="3" name="Marcador de contenido 2"/>
+          <p:cNvSpPr>
+            <a:spLocks noGrp="1"/>
+          </p:cNvSpPr>
+          <p:nvPr>
+            <p:ph idx="1"/>
+          </p:nvPr>
+        </p:nvSpPr>
+        <p:spPr/>
+        <p:txBody>
+          <a:bodyPr/>
+          <a:lstStyle/>
+          <a:p>
             <a:endParaRPr lang="es-ES" dirty="0"/>
-          </a:p>
-        </p:txBody>
-      </p:sp>
-      <p:sp>
-        <p:nvSpPr>
-          <p:cNvPr id="3" name="Marcador de contenido 2"/>
-          <p:cNvSpPr>
-            <a:spLocks noGrp="1"/>
-          </p:cNvSpPr>
-          <p:nvPr>
-            <p:ph idx="1"/>
-          </p:nvPr>
-        </p:nvSpPr>
-        <p:spPr/>
-        <p:txBody>
-          <a:bodyPr/>
-          <a:lstStyle/>
-          <a:p>
-            <a:endParaRPr lang="es-ES"/>
           </a:p>
         </p:txBody>
       </p:sp>

</xml_diff>